<commit_message>
emnlp poster with logos
</commit_message>
<xml_diff>
--- a/paper/covid_emnlp.pptx
+++ b/paper/covid_emnlp.pptx
@@ -4,6 +4,9 @@
   <p:sldMasterIdLst>
     <p:sldMasterId id="2147483648" r:id="rId1"/>
   </p:sldMasterIdLst>
+  <p:notesMasterIdLst>
+    <p:notesMasterId r:id="rId3"/>
+  </p:notesMasterIdLst>
   <p:sldIdLst>
     <p:sldId id="256" r:id="rId2"/>
   </p:sldIdLst>
@@ -119,6 +122,440 @@
     </p:ext>
   </p:extLst>
 </p:presentation>
+</file>
+
+<file path=ppt/notesMasters/notesMaster1.xml><?xml version="1.0" encoding="utf-8"?>
+<p:notesMaster xmlns:a="http://schemas.openxmlformats.org/drawingml/2006/main" xmlns:r="http://schemas.openxmlformats.org/officeDocument/2006/relationships" xmlns:p="http://schemas.openxmlformats.org/presentationml/2006/main">
+  <p:cSld>
+    <p:bg>
+      <p:bgRef idx="1001">
+        <a:schemeClr val="bg1"/>
+      </p:bgRef>
+    </p:bg>
+    <p:spTree>
+      <p:nvGrpSpPr>
+        <p:cNvPr id="1" name=""/>
+        <p:cNvGrpSpPr/>
+        <p:nvPr/>
+      </p:nvGrpSpPr>
+      <p:grpSpPr>
+        <a:xfrm>
+          <a:off x="0" y="0"/>
+          <a:ext cx="0" cy="0"/>
+          <a:chOff x="0" y="0"/>
+          <a:chExt cx="0" cy="0"/>
+        </a:xfrm>
+      </p:grpSpPr>
+      <p:sp>
+        <p:nvSpPr>
+          <p:cNvPr id="2" name="Header Placeholder 1"/>
+          <p:cNvSpPr>
+            <a:spLocks noGrp="1"/>
+          </p:cNvSpPr>
+          <p:nvPr>
+            <p:ph type="hdr" sz="quarter"/>
+          </p:nvPr>
+        </p:nvSpPr>
+        <p:spPr>
+          <a:xfrm>
+            <a:off x="0" y="0"/>
+            <a:ext cx="2971800" cy="458788"/>
+          </a:xfrm>
+          <a:prstGeom prst="rect">
+            <a:avLst/>
+          </a:prstGeom>
+        </p:spPr>
+        <p:txBody>
+          <a:bodyPr vert="horz" lIns="91440" tIns="45720" rIns="91440" bIns="45720" rtlCol="0"/>
+          <a:lstStyle>
+            <a:lvl1pPr algn="l">
+              <a:defRPr sz="1200"/>
+            </a:lvl1pPr>
+          </a:lstStyle>
+          <a:p>
+            <a:endParaRPr lang="en-CH"/>
+          </a:p>
+        </p:txBody>
+      </p:sp>
+      <p:sp>
+        <p:nvSpPr>
+          <p:cNvPr id="3" name="Date Placeholder 2"/>
+          <p:cNvSpPr>
+            <a:spLocks noGrp="1"/>
+          </p:cNvSpPr>
+          <p:nvPr>
+            <p:ph type="dt" idx="1"/>
+          </p:nvPr>
+        </p:nvSpPr>
+        <p:spPr>
+          <a:xfrm>
+            <a:off x="3884613" y="0"/>
+            <a:ext cx="2971800" cy="458788"/>
+          </a:xfrm>
+          <a:prstGeom prst="rect">
+            <a:avLst/>
+          </a:prstGeom>
+        </p:spPr>
+        <p:txBody>
+          <a:bodyPr vert="horz" lIns="91440" tIns="45720" rIns="91440" bIns="45720" rtlCol="0"/>
+          <a:lstStyle>
+            <a:lvl1pPr algn="r">
+              <a:defRPr sz="1200"/>
+            </a:lvl1pPr>
+          </a:lstStyle>
+          <a:p>
+            <a:fld id="{FAF7755A-06A1-254B-927F-ED51A46FBADE}" type="datetimeFigureOut">
+              <a:rPr lang="en-CH" smtClean="0"/>
+              <a:t>07.11.20</a:t>
+            </a:fld>
+            <a:endParaRPr lang="en-CH"/>
+          </a:p>
+        </p:txBody>
+      </p:sp>
+      <p:sp>
+        <p:nvSpPr>
+          <p:cNvPr id="4" name="Slide Image Placeholder 3"/>
+          <p:cNvSpPr>
+            <a:spLocks noGrp="1" noRot="1" noChangeAspect="1"/>
+          </p:cNvSpPr>
+          <p:nvPr>
+            <p:ph type="sldImg" idx="2"/>
+          </p:nvPr>
+        </p:nvSpPr>
+        <p:spPr>
+          <a:xfrm>
+            <a:off x="685800" y="1143000"/>
+            <a:ext cx="5486400" cy="3086100"/>
+          </a:xfrm>
+          <a:prstGeom prst="rect">
+            <a:avLst/>
+          </a:prstGeom>
+          <a:noFill/>
+          <a:ln w="12700">
+            <a:solidFill>
+              <a:prstClr val="black"/>
+            </a:solidFill>
+          </a:ln>
+        </p:spPr>
+        <p:txBody>
+          <a:bodyPr vert="horz" lIns="91440" tIns="45720" rIns="91440" bIns="45720" rtlCol="0" anchor="ctr"/>
+          <a:lstStyle/>
+          <a:p>
+            <a:endParaRPr lang="en-CH"/>
+          </a:p>
+        </p:txBody>
+      </p:sp>
+      <p:sp>
+        <p:nvSpPr>
+          <p:cNvPr id="5" name="Notes Placeholder 4"/>
+          <p:cNvSpPr>
+            <a:spLocks noGrp="1"/>
+          </p:cNvSpPr>
+          <p:nvPr>
+            <p:ph type="body" sz="quarter" idx="3"/>
+          </p:nvPr>
+        </p:nvSpPr>
+        <p:spPr>
+          <a:xfrm>
+            <a:off x="685800" y="4400550"/>
+            <a:ext cx="5486400" cy="3600450"/>
+          </a:xfrm>
+          <a:prstGeom prst="rect">
+            <a:avLst/>
+          </a:prstGeom>
+        </p:spPr>
+        <p:txBody>
+          <a:bodyPr vert="horz" lIns="91440" tIns="45720" rIns="91440" bIns="45720" rtlCol="0"/>
+          <a:lstStyle/>
+          <a:p>
+            <a:pPr lvl="0"/>
+            <a:r>
+              <a:rPr lang="en-GB"/>
+              <a:t>Click to edit Master text styles</a:t>
+            </a:r>
+          </a:p>
+          <a:p>
+            <a:pPr lvl="1"/>
+            <a:r>
+              <a:rPr lang="en-GB"/>
+              <a:t>Second level</a:t>
+            </a:r>
+          </a:p>
+          <a:p>
+            <a:pPr lvl="2"/>
+            <a:r>
+              <a:rPr lang="en-GB"/>
+              <a:t>Third level</a:t>
+            </a:r>
+          </a:p>
+          <a:p>
+            <a:pPr lvl="3"/>
+            <a:r>
+              <a:rPr lang="en-GB"/>
+              <a:t>Fourth level</a:t>
+            </a:r>
+          </a:p>
+          <a:p>
+            <a:pPr lvl="4"/>
+            <a:r>
+              <a:rPr lang="en-GB"/>
+              <a:t>Fifth level</a:t>
+            </a:r>
+            <a:endParaRPr lang="en-CH"/>
+          </a:p>
+        </p:txBody>
+      </p:sp>
+      <p:sp>
+        <p:nvSpPr>
+          <p:cNvPr id="6" name="Footer Placeholder 5"/>
+          <p:cNvSpPr>
+            <a:spLocks noGrp="1"/>
+          </p:cNvSpPr>
+          <p:nvPr>
+            <p:ph type="ftr" sz="quarter" idx="4"/>
+          </p:nvPr>
+        </p:nvSpPr>
+        <p:spPr>
+          <a:xfrm>
+            <a:off x="0" y="8685213"/>
+            <a:ext cx="2971800" cy="458787"/>
+          </a:xfrm>
+          <a:prstGeom prst="rect">
+            <a:avLst/>
+          </a:prstGeom>
+        </p:spPr>
+        <p:txBody>
+          <a:bodyPr vert="horz" lIns="91440" tIns="45720" rIns="91440" bIns="45720" rtlCol="0" anchor="b"/>
+          <a:lstStyle>
+            <a:lvl1pPr algn="l">
+              <a:defRPr sz="1200"/>
+            </a:lvl1pPr>
+          </a:lstStyle>
+          <a:p>
+            <a:endParaRPr lang="en-CH"/>
+          </a:p>
+        </p:txBody>
+      </p:sp>
+      <p:sp>
+        <p:nvSpPr>
+          <p:cNvPr id="7" name="Slide Number Placeholder 6"/>
+          <p:cNvSpPr>
+            <a:spLocks noGrp="1"/>
+          </p:cNvSpPr>
+          <p:nvPr>
+            <p:ph type="sldNum" sz="quarter" idx="5"/>
+          </p:nvPr>
+        </p:nvSpPr>
+        <p:spPr>
+          <a:xfrm>
+            <a:off x="3884613" y="8685213"/>
+            <a:ext cx="2971800" cy="458787"/>
+          </a:xfrm>
+          <a:prstGeom prst="rect">
+            <a:avLst/>
+          </a:prstGeom>
+        </p:spPr>
+        <p:txBody>
+          <a:bodyPr vert="horz" lIns="91440" tIns="45720" rIns="91440" bIns="45720" rtlCol="0" anchor="b"/>
+          <a:lstStyle>
+            <a:lvl1pPr algn="r">
+              <a:defRPr sz="1200"/>
+            </a:lvl1pPr>
+          </a:lstStyle>
+          <a:p>
+            <a:fld id="{09A76CB3-1701-4743-AA69-0691F7A85E4E}" type="slidenum">
+              <a:rPr lang="en-CH" smtClean="0"/>
+              <a:t>‹#›</a:t>
+            </a:fld>
+            <a:endParaRPr lang="en-CH"/>
+          </a:p>
+        </p:txBody>
+      </p:sp>
+    </p:spTree>
+    <p:extLst>
+      <p:ext uri="{BB962C8B-B14F-4D97-AF65-F5344CB8AC3E}">
+        <p14:creationId xmlns:p14="http://schemas.microsoft.com/office/powerpoint/2010/main" val="3473941442"/>
+      </p:ext>
+    </p:extLst>
+  </p:cSld>
+  <p:clrMap bg1="lt1" tx1="dk1" bg2="lt2" tx2="dk2" accent1="accent1" accent2="accent2" accent3="accent3" accent4="accent4" accent5="accent5" accent6="accent6" hlink="hlink" folHlink="folHlink"/>
+  <p:notesStyle>
+    <a:lvl1pPr marL="0" algn="l" defTabSz="914400" rtl="0" eaLnBrk="1" latinLnBrk="0" hangingPunct="1">
+      <a:defRPr sz="1200" kern="1200">
+        <a:solidFill>
+          <a:schemeClr val="tx1"/>
+        </a:solidFill>
+        <a:latin typeface="+mn-lt"/>
+        <a:ea typeface="+mn-ea"/>
+        <a:cs typeface="+mn-cs"/>
+      </a:defRPr>
+    </a:lvl1pPr>
+    <a:lvl2pPr marL="457200" algn="l" defTabSz="914400" rtl="0" eaLnBrk="1" latinLnBrk="0" hangingPunct="1">
+      <a:defRPr sz="1200" kern="1200">
+        <a:solidFill>
+          <a:schemeClr val="tx1"/>
+        </a:solidFill>
+        <a:latin typeface="+mn-lt"/>
+        <a:ea typeface="+mn-ea"/>
+        <a:cs typeface="+mn-cs"/>
+      </a:defRPr>
+    </a:lvl2pPr>
+    <a:lvl3pPr marL="914400" algn="l" defTabSz="914400" rtl="0" eaLnBrk="1" latinLnBrk="0" hangingPunct="1">
+      <a:defRPr sz="1200" kern="1200">
+        <a:solidFill>
+          <a:schemeClr val="tx1"/>
+        </a:solidFill>
+        <a:latin typeface="+mn-lt"/>
+        <a:ea typeface="+mn-ea"/>
+        <a:cs typeface="+mn-cs"/>
+      </a:defRPr>
+    </a:lvl3pPr>
+    <a:lvl4pPr marL="1371600" algn="l" defTabSz="914400" rtl="0" eaLnBrk="1" latinLnBrk="0" hangingPunct="1">
+      <a:defRPr sz="1200" kern="1200">
+        <a:solidFill>
+          <a:schemeClr val="tx1"/>
+        </a:solidFill>
+        <a:latin typeface="+mn-lt"/>
+        <a:ea typeface="+mn-ea"/>
+        <a:cs typeface="+mn-cs"/>
+      </a:defRPr>
+    </a:lvl4pPr>
+    <a:lvl5pPr marL="1828800" algn="l" defTabSz="914400" rtl="0" eaLnBrk="1" latinLnBrk="0" hangingPunct="1">
+      <a:defRPr sz="1200" kern="1200">
+        <a:solidFill>
+          <a:schemeClr val="tx1"/>
+        </a:solidFill>
+        <a:latin typeface="+mn-lt"/>
+        <a:ea typeface="+mn-ea"/>
+        <a:cs typeface="+mn-cs"/>
+      </a:defRPr>
+    </a:lvl5pPr>
+    <a:lvl6pPr marL="2286000" algn="l" defTabSz="914400" rtl="0" eaLnBrk="1" latinLnBrk="0" hangingPunct="1">
+      <a:defRPr sz="1200" kern="1200">
+        <a:solidFill>
+          <a:schemeClr val="tx1"/>
+        </a:solidFill>
+        <a:latin typeface="+mn-lt"/>
+        <a:ea typeface="+mn-ea"/>
+        <a:cs typeface="+mn-cs"/>
+      </a:defRPr>
+    </a:lvl6pPr>
+    <a:lvl7pPr marL="2743200" algn="l" defTabSz="914400" rtl="0" eaLnBrk="1" latinLnBrk="0" hangingPunct="1">
+      <a:defRPr sz="1200" kern="1200">
+        <a:solidFill>
+          <a:schemeClr val="tx1"/>
+        </a:solidFill>
+        <a:latin typeface="+mn-lt"/>
+        <a:ea typeface="+mn-ea"/>
+        <a:cs typeface="+mn-cs"/>
+      </a:defRPr>
+    </a:lvl7pPr>
+    <a:lvl8pPr marL="3200400" algn="l" defTabSz="914400" rtl="0" eaLnBrk="1" latinLnBrk="0" hangingPunct="1">
+      <a:defRPr sz="1200" kern="1200">
+        <a:solidFill>
+          <a:schemeClr val="tx1"/>
+        </a:solidFill>
+        <a:latin typeface="+mn-lt"/>
+        <a:ea typeface="+mn-ea"/>
+        <a:cs typeface="+mn-cs"/>
+      </a:defRPr>
+    </a:lvl8pPr>
+    <a:lvl9pPr marL="3657600" algn="l" defTabSz="914400" rtl="0" eaLnBrk="1" latinLnBrk="0" hangingPunct="1">
+      <a:defRPr sz="1200" kern="1200">
+        <a:solidFill>
+          <a:schemeClr val="tx1"/>
+        </a:solidFill>
+        <a:latin typeface="+mn-lt"/>
+        <a:ea typeface="+mn-ea"/>
+        <a:cs typeface="+mn-cs"/>
+      </a:defRPr>
+    </a:lvl9pPr>
+  </p:notesStyle>
+</p:notesMaster>
+</file>
+
+<file path=ppt/notesSlides/notesSlide1.xml><?xml version="1.0" encoding="utf-8"?>
+<p:notes xmlns:a="http://schemas.openxmlformats.org/drawingml/2006/main" xmlns:r="http://schemas.openxmlformats.org/officeDocument/2006/relationships" xmlns:p="http://schemas.openxmlformats.org/presentationml/2006/main">
+  <p:cSld>
+    <p:spTree>
+      <p:nvGrpSpPr>
+        <p:cNvPr id="1" name=""/>
+        <p:cNvGrpSpPr/>
+        <p:nvPr/>
+      </p:nvGrpSpPr>
+      <p:grpSpPr>
+        <a:xfrm>
+          <a:off x="0" y="0"/>
+          <a:ext cx="0" cy="0"/>
+          <a:chOff x="0" y="0"/>
+          <a:chExt cx="0" cy="0"/>
+        </a:xfrm>
+      </p:grpSpPr>
+      <p:sp>
+        <p:nvSpPr>
+          <p:cNvPr id="2" name="Slide Image Placeholder 1"/>
+          <p:cNvSpPr>
+            <a:spLocks noGrp="1" noRot="1" noChangeAspect="1"/>
+          </p:cNvSpPr>
+          <p:nvPr>
+            <p:ph type="sldImg"/>
+          </p:nvPr>
+        </p:nvSpPr>
+        <p:spPr/>
+      </p:sp>
+      <p:sp>
+        <p:nvSpPr>
+          <p:cNvPr id="3" name="Notes Placeholder 2"/>
+          <p:cNvSpPr>
+            <a:spLocks noGrp="1"/>
+          </p:cNvSpPr>
+          <p:nvPr>
+            <p:ph type="body" idx="1"/>
+          </p:nvPr>
+        </p:nvSpPr>
+        <p:spPr/>
+        <p:txBody>
+          <a:bodyPr/>
+          <a:lstStyle/>
+          <a:p>
+            <a:endParaRPr lang="en-CH" dirty="0"/>
+          </a:p>
+        </p:txBody>
+      </p:sp>
+      <p:sp>
+        <p:nvSpPr>
+          <p:cNvPr id="4" name="Slide Number Placeholder 3"/>
+          <p:cNvSpPr>
+            <a:spLocks noGrp="1"/>
+          </p:cNvSpPr>
+          <p:nvPr>
+            <p:ph type="sldNum" sz="quarter" idx="5"/>
+          </p:nvPr>
+        </p:nvSpPr>
+        <p:spPr/>
+        <p:txBody>
+          <a:bodyPr/>
+          <a:lstStyle/>
+          <a:p>
+            <a:fld id="{09A76CB3-1701-4743-AA69-0691F7A85E4E}" type="slidenum">
+              <a:rPr lang="en-CH" smtClean="0"/>
+              <a:t>1</a:t>
+            </a:fld>
+            <a:endParaRPr lang="en-CH"/>
+          </a:p>
+        </p:txBody>
+      </p:sp>
+    </p:spTree>
+    <p:extLst>
+      <p:ext uri="{BB962C8B-B14F-4D97-AF65-F5344CB8AC3E}">
+        <p14:creationId xmlns:p14="http://schemas.microsoft.com/office/powerpoint/2010/main" val="1853439706"/>
+      </p:ext>
+    </p:extLst>
+  </p:cSld>
+  <p:clrMapOvr>
+    <a:masterClrMapping/>
+  </p:clrMapOvr>
+</p:notes>
 </file>
 
 <file path=ppt/slideLayouts/slideLayout1.xml><?xml version="1.0" encoding="utf-8"?>
@@ -3349,8 +3786,8 @@
         </p:nvSpPr>
         <p:spPr>
           <a:xfrm>
-            <a:off x="450938" y="1497702"/>
-            <a:ext cx="5160722" cy="2862322"/>
+            <a:off x="451802" y="1576596"/>
+            <a:ext cx="5160722" cy="2769989"/>
           </a:xfrm>
           <a:prstGeom prst="rect">
             <a:avLst/>
@@ -3372,7 +3809,7 @@
               </a:spcAft>
             </a:pPr>
             <a:r>
-              <a:rPr lang="en-US" sz="3000" i="1" dirty="0">
+              <a:rPr lang="en-US" sz="2900" i="1" dirty="0">
                 <a:solidFill>
                   <a:schemeClr val="accent1">
                     <a:lumMod val="50000"/>
@@ -3383,7 +3820,7 @@
               <a:t>Entity recognition and normalization on COVID-19 literature using a CRAFT-trained </a:t>
             </a:r>
             <a:r>
-              <a:rPr lang="en-US" sz="3000" i="1" dirty="0" err="1">
+              <a:rPr lang="en-US" sz="2900" i="1" dirty="0" err="1">
                 <a:solidFill>
                   <a:schemeClr val="accent1">
                     <a:lumMod val="50000"/>
@@ -3394,7 +3831,7 @@
               <a:t>BioBERT</a:t>
             </a:r>
             <a:r>
-              <a:rPr lang="en-US" sz="3000" i="1" dirty="0">
+              <a:rPr lang="en-US" sz="2900" i="1" dirty="0">
                 <a:solidFill>
                   <a:schemeClr val="accent1">
                     <a:lumMod val="50000"/>
@@ -3402,7 +3839,7 @@
                 </a:solidFill>
                 <a:latin typeface="Cambria" panose="02040503050406030204" pitchFamily="18" charset="0"/>
               </a:rPr>
-              <a:t> model for its precision and our dictionary-based tool for its recall.</a:t>
+              <a:t> model for precision and our dictionary-based tool for recall and entity identifiers. </a:t>
             </a:r>
           </a:p>
         </p:txBody>
@@ -3568,7 +4005,7 @@
           <a:p>
             <a:pPr algn="ctr"/>
             <a:r>
-              <a:rPr lang="en-US" sz="3000" b="1" dirty="0">
+              <a:rPr lang="en-US" sz="2700" b="1" dirty="0">
                 <a:solidFill>
                   <a:schemeClr val="accent1">
                     <a:lumMod val="50000"/>
@@ -3581,7 +4018,7 @@
               <a:t>Annotating the Pandemic: NER and NEN of </a:t>
             </a:r>
             <a:r>
-              <a:rPr lang="en-US" sz="3000" b="1" dirty="0" err="1">
+              <a:rPr lang="en-US" sz="2700" b="1" dirty="0" err="1">
                 <a:solidFill>
                   <a:schemeClr val="accent1">
                     <a:lumMod val="50000"/>
@@ -3594,7 +4031,7 @@
               <a:t>LitCovid</a:t>
             </a:r>
             <a:r>
-              <a:rPr lang="en-US" sz="3000" b="1" dirty="0">
+              <a:rPr lang="en-US" sz="2700" b="1" dirty="0">
                 <a:solidFill>
                   <a:schemeClr val="accent1">
                     <a:lumMod val="50000"/>
@@ -3623,8 +4060,8 @@
         </p:nvSpPr>
         <p:spPr>
           <a:xfrm>
-            <a:off x="6096000" y="3668658"/>
-            <a:ext cx="2846832" cy="1691640"/>
+            <a:off x="10527957" y="3668658"/>
+            <a:ext cx="1664043" cy="1691640"/>
           </a:xfrm>
           <a:prstGeom prst="rect">
             <a:avLst/>
@@ -3659,69 +4096,11 @@
           <a:lstStyle/>
           <a:p>
             <a:pPr algn="r"/>
-            <a:r>
-              <a:rPr lang="en-US" sz="780" dirty="0">
-                <a:latin typeface="DejaVu Sans" panose="020B0603030804020204" pitchFamily="34" charset="0"/>
-                <a:ea typeface="DejaVu Sans" panose="020B0603030804020204" pitchFamily="34" charset="0"/>
-                <a:cs typeface="DejaVu Sans" panose="020B0603030804020204" pitchFamily="34" charset="0"/>
-              </a:rPr>
-              <a:t>Annotations</a:t>
-            </a:r>
-          </a:p>
-          <a:p>
-            <a:pPr algn="r"/>
-            <a:r>
-              <a:rPr lang="en-US" sz="780" dirty="0">
-                <a:latin typeface="DejaVu Sans" panose="020B0603030804020204" pitchFamily="34" charset="0"/>
-                <a:ea typeface="DejaVu Sans" panose="020B0603030804020204" pitchFamily="34" charset="0"/>
-                <a:cs typeface="DejaVu Sans" panose="020B0603030804020204" pitchFamily="34" charset="0"/>
-              </a:rPr>
-              <a:t>per entity type</a:t>
-            </a:r>
-          </a:p>
-          <a:p>
-            <a:pPr algn="r"/>
-            <a:r>
-              <a:rPr lang="en-US" sz="780" dirty="0">
-                <a:latin typeface="DejaVu Sans" panose="020B0603030804020204" pitchFamily="34" charset="0"/>
-                <a:ea typeface="DejaVu Sans" panose="020B0603030804020204" pitchFamily="34" charset="0"/>
-                <a:cs typeface="DejaVu Sans" panose="020B0603030804020204" pitchFamily="34" charset="0"/>
-              </a:rPr>
-              <a:t>for PubMed </a:t>
-            </a:r>
-          </a:p>
-          <a:p>
-            <a:pPr algn="r"/>
-            <a:r>
-              <a:rPr lang="en-US" sz="780" dirty="0">
-                <a:latin typeface="DejaVu Sans" panose="020B0603030804020204" pitchFamily="34" charset="0"/>
-                <a:ea typeface="DejaVu Sans" panose="020B0603030804020204" pitchFamily="34" charset="0"/>
-                <a:cs typeface="DejaVu Sans" panose="020B0603030804020204" pitchFamily="34" charset="0"/>
-              </a:rPr>
-              <a:t>(abstracts) and</a:t>
-            </a:r>
-          </a:p>
-          <a:p>
-            <a:pPr algn="r"/>
-            <a:r>
-              <a:rPr lang="en-US" sz="780" dirty="0">
-                <a:latin typeface="DejaVu Sans" panose="020B0603030804020204" pitchFamily="34" charset="0"/>
-                <a:ea typeface="DejaVu Sans" panose="020B0603030804020204" pitchFamily="34" charset="0"/>
-                <a:cs typeface="DejaVu Sans" panose="020B0603030804020204" pitchFamily="34" charset="0"/>
-              </a:rPr>
-              <a:t>PubMed Central</a:t>
-            </a:r>
-          </a:p>
-          <a:p>
-            <a:pPr algn="r"/>
-            <a:r>
-              <a:rPr lang="en-US" sz="780" dirty="0">
-                <a:latin typeface="DejaVu Sans" panose="020B0603030804020204" pitchFamily="34" charset="0"/>
-                <a:ea typeface="DejaVu Sans" panose="020B0603030804020204" pitchFamily="34" charset="0"/>
-                <a:cs typeface="DejaVu Sans" panose="020B0603030804020204" pitchFamily="34" charset="0"/>
-              </a:rPr>
-              <a:t>(full articles)</a:t>
-            </a:r>
+            <a:endParaRPr lang="en-US" sz="780" dirty="0">
+              <a:latin typeface="DejaVu Sans" panose="020B0603030804020204" pitchFamily="34" charset="0"/>
+              <a:ea typeface="DejaVu Sans" panose="020B0603030804020204" pitchFamily="34" charset="0"/>
+              <a:cs typeface="DejaVu Sans" panose="020B0603030804020204" pitchFamily="34" charset="0"/>
+            </a:endParaRPr>
           </a:p>
         </p:txBody>
       </p:sp>
@@ -3739,8 +4118,8 @@
         </p:nvSpPr>
         <p:spPr>
           <a:xfrm>
-            <a:off x="6096000" y="1576596"/>
-            <a:ext cx="2846832" cy="1691640"/>
+            <a:off x="6096000" y="3668658"/>
+            <a:ext cx="2442519" cy="1691640"/>
           </a:xfrm>
           <a:prstGeom prst="rect">
             <a:avLst/>
@@ -3794,8 +4173,8 @@
         </p:nvSpPr>
         <p:spPr>
           <a:xfrm>
-            <a:off x="9345168" y="1576596"/>
-            <a:ext cx="2846832" cy="1691640"/>
+            <a:off x="6096000" y="1675452"/>
+            <a:ext cx="6096000" cy="1691640"/>
           </a:xfrm>
           <a:prstGeom prst="rect">
             <a:avLst/>
@@ -3831,123 +4210,16 @@
           <a:lstStyle/>
           <a:p>
             <a:pPr algn="just"/>
-            <a:r>
-              <a:rPr lang="en-US" sz="780" b="1" dirty="0">
-                <a:solidFill>
-                  <a:schemeClr val="accent1">
-                    <a:lumMod val="50000"/>
-                  </a:schemeClr>
-                </a:solidFill>
-                <a:latin typeface="DejaVu Sans Condensed" panose="020B0606030804020204" pitchFamily="34" charset="0"/>
-                <a:ea typeface="DejaVu Sans Condensed" panose="020B0606030804020204" pitchFamily="34" charset="0"/>
-                <a:cs typeface="DejaVu Sans Condensed" panose="020B0606030804020204" pitchFamily="34" charset="0"/>
-              </a:rPr>
-              <a:t>Pipeline output is uploaded to </a:t>
-            </a:r>
-            <a:r>
-              <a:rPr lang="en-US" sz="780" b="1" dirty="0" err="1">
-                <a:solidFill>
-                  <a:schemeClr val="accent1">
-                    <a:lumMod val="50000"/>
-                  </a:schemeClr>
-                </a:solidFill>
-                <a:latin typeface="DejaVu Sans Condensed" panose="020B0606030804020204" pitchFamily="34" charset="0"/>
-                <a:ea typeface="DejaVu Sans Condensed" panose="020B0606030804020204" pitchFamily="34" charset="0"/>
-                <a:cs typeface="DejaVu Sans Condensed" panose="020B0606030804020204" pitchFamily="34" charset="0"/>
-              </a:rPr>
-              <a:t>PubAnnotation</a:t>
-            </a:r>
-            <a:r>
-              <a:rPr lang="en-US" sz="780" b="1" dirty="0">
-                <a:solidFill>
-                  <a:schemeClr val="accent1">
-                    <a:lumMod val="50000"/>
-                  </a:schemeClr>
-                </a:solidFill>
-                <a:latin typeface="DejaVu Sans Condensed" panose="020B0606030804020204" pitchFamily="34" charset="0"/>
-                <a:ea typeface="DejaVu Sans Condensed" panose="020B0606030804020204" pitchFamily="34" charset="0"/>
-                <a:cs typeface="DejaVu Sans Condensed" panose="020B0606030804020204" pitchFamily="34" charset="0"/>
-              </a:rPr>
-              <a:t>, for example, where it is visualized via </a:t>
-            </a:r>
-            <a:r>
-              <a:rPr lang="en-US" sz="780" b="1" dirty="0" err="1">
-                <a:solidFill>
-                  <a:schemeClr val="accent1">
-                    <a:lumMod val="50000"/>
-                  </a:schemeClr>
-                </a:solidFill>
-                <a:latin typeface="DejaVu Sans Condensed" panose="020B0606030804020204" pitchFamily="34" charset="0"/>
-                <a:ea typeface="DejaVu Sans Condensed" panose="020B0606030804020204" pitchFamily="34" charset="0"/>
-                <a:cs typeface="DejaVu Sans Condensed" panose="020B0606030804020204" pitchFamily="34" charset="0"/>
-              </a:rPr>
-              <a:t>TextAE</a:t>
-            </a:r>
-            <a:r>
-              <a:rPr lang="en-US" sz="780" b="1" dirty="0">
-                <a:solidFill>
-                  <a:schemeClr val="accent1">
-                    <a:lumMod val="50000"/>
-                  </a:schemeClr>
-                </a:solidFill>
-                <a:latin typeface="DejaVu Sans Condensed" panose="020B0606030804020204" pitchFamily="34" charset="0"/>
-                <a:ea typeface="DejaVu Sans Condensed" panose="020B0606030804020204" pitchFamily="34" charset="0"/>
-                <a:cs typeface="DejaVu Sans Condensed" panose="020B0606030804020204" pitchFamily="34" charset="0"/>
-              </a:rPr>
-              <a:t>. We're also uploading our results to </a:t>
-            </a:r>
-            <a:r>
-              <a:rPr lang="en-US" sz="780" b="1" dirty="0" err="1">
-                <a:solidFill>
-                  <a:schemeClr val="accent1">
-                    <a:lumMod val="50000"/>
-                  </a:schemeClr>
-                </a:solidFill>
-                <a:latin typeface="DejaVu Sans Condensed" panose="020B0606030804020204" pitchFamily="34" charset="0"/>
-                <a:ea typeface="DejaVu Sans Condensed" panose="020B0606030804020204" pitchFamily="34" charset="0"/>
-                <a:cs typeface="DejaVu Sans Condensed" panose="020B0606030804020204" pitchFamily="34" charset="0"/>
-              </a:rPr>
-              <a:t>EuroPMC</a:t>
-            </a:r>
-            <a:r>
-              <a:rPr lang="en-US" sz="780" b="1" dirty="0">
-                <a:solidFill>
-                  <a:schemeClr val="accent1">
-                    <a:lumMod val="50000"/>
-                  </a:schemeClr>
-                </a:solidFill>
-                <a:latin typeface="DejaVu Sans Condensed" panose="020B0606030804020204" pitchFamily="34" charset="0"/>
-                <a:ea typeface="DejaVu Sans Condensed" panose="020B0606030804020204" pitchFamily="34" charset="0"/>
-                <a:cs typeface="DejaVu Sans Condensed" panose="020B0606030804020204" pitchFamily="34" charset="0"/>
-              </a:rPr>
-              <a:t>, our own webserver using BRAT, and allowing downloads in JSON and </a:t>
-            </a:r>
-            <a:r>
-              <a:rPr lang="en-US" sz="780" b="1" dirty="0" err="1">
-                <a:solidFill>
-                  <a:schemeClr val="accent1">
-                    <a:lumMod val="50000"/>
-                  </a:schemeClr>
-                </a:solidFill>
-                <a:latin typeface="DejaVu Sans Condensed" panose="020B0606030804020204" pitchFamily="34" charset="0"/>
-                <a:ea typeface="DejaVu Sans Condensed" panose="020B0606030804020204" pitchFamily="34" charset="0"/>
-                <a:cs typeface="DejaVu Sans Condensed" panose="020B0606030804020204" pitchFamily="34" charset="0"/>
-              </a:rPr>
-              <a:t>CoNLL</a:t>
-            </a:r>
-            <a:r>
-              <a:rPr lang="en-US" sz="780" b="1" dirty="0">
-                <a:solidFill>
-                  <a:schemeClr val="accent1">
-                    <a:lumMod val="50000"/>
-                  </a:schemeClr>
-                </a:solidFill>
-                <a:latin typeface="DejaVu Sans Condensed" panose="020B0606030804020204" pitchFamily="34" charset="0"/>
-                <a:ea typeface="DejaVu Sans Condensed" panose="020B0606030804020204" pitchFamily="34" charset="0"/>
-                <a:cs typeface="DejaVu Sans Condensed" panose="020B0606030804020204" pitchFamily="34" charset="0"/>
-              </a:rPr>
-              <a:t> TSV for downstream tasks.</a:t>
-            </a:r>
+            <a:endParaRPr lang="en-US" sz="770" b="1" dirty="0">
+              <a:solidFill>
+                <a:schemeClr val="accent1">
+                  <a:lumMod val="50000"/>
+                </a:schemeClr>
+              </a:solidFill>
+              <a:latin typeface="DejaVu Sans Condensed" panose="020B0606030804020204" pitchFamily="34" charset="0"/>
+              <a:ea typeface="DejaVu Sans Condensed" panose="020B0606030804020204" pitchFamily="34" charset="0"/>
+              <a:cs typeface="DejaVu Sans Condensed" panose="020B0606030804020204" pitchFamily="34" charset="0"/>
+            </a:endParaRPr>
           </a:p>
         </p:txBody>
       </p:sp>
@@ -3965,8 +4237,8 @@
         </p:nvSpPr>
         <p:spPr>
           <a:xfrm>
-            <a:off x="9345168" y="3653028"/>
-            <a:ext cx="2846832" cy="1691640"/>
+            <a:off x="8836640" y="3668658"/>
+            <a:ext cx="1426801" cy="1674733"/>
           </a:xfrm>
           <a:prstGeom prst="rect">
             <a:avLst/>
@@ -3997,12 +4269,12 @@
           </a:fontRef>
         </p:style>
         <p:txBody>
-          <a:bodyPr rtlCol="0" anchor="ctr"/>
+          <a:bodyPr lIns="72000" tIns="36000" rIns="72000" bIns="36000" rtlCol="0" anchor="ctr"/>
           <a:lstStyle/>
           <a:p>
             <a:pPr algn="just"/>
             <a:r>
-              <a:rPr lang="en-US" sz="740" i="1" dirty="0" err="1">
+              <a:rPr lang="en-US" sz="550" i="1" dirty="0" err="1">
                 <a:latin typeface="DejaVu Sans Condensed" panose="020B0606030804020204" pitchFamily="34" charset="0"/>
                 <a:ea typeface="DejaVu Sans Condensed" panose="020B0606030804020204" pitchFamily="34" charset="0"/>
                 <a:cs typeface="DejaVu Sans Condensed" panose="020B0606030804020204" pitchFamily="34" charset="0"/>
@@ -4010,15 +4282,15 @@
               <a:t>LitCovid</a:t>
             </a:r>
             <a:r>
-              <a:rPr lang="en-US" sz="740" i="1" dirty="0">
+              <a:rPr lang="en-US" sz="550" i="1" dirty="0">
                 <a:latin typeface="DejaVu Sans Condensed" panose="020B0606030804020204" pitchFamily="34" charset="0"/>
                 <a:ea typeface="DejaVu Sans Condensed" panose="020B0606030804020204" pitchFamily="34" charset="0"/>
                 <a:cs typeface="DejaVu Sans Condensed" panose="020B0606030804020204" pitchFamily="34" charset="0"/>
               </a:rPr>
-              <a:t> is a dataset of 20 000 PubMed articles related to COVID-19. We are using our pipeline, which performed with F1-score of 0.74 and 0.92 on the CRAFT corpus, depending on entity type (chemical, disease...). Output of models (</a:t>
-            </a:r>
-            <a:r>
-              <a:rPr lang="en-US" sz="740" i="1" dirty="0" err="1">
+              <a:t> is a dataset of PubMed articles related to COVID-19. We use our pipeline, which performs with a F1-score of 0.74 - 0.92 on CRAFT, depending on entity type (chemical, disease...). Our pipeline merges the output of different models (</a:t>
+            </a:r>
+            <a:r>
+              <a:rPr lang="en-US" sz="550" i="1" dirty="0" err="1">
                 <a:latin typeface="DejaVu Sans Condensed" panose="020B0606030804020204" pitchFamily="34" charset="0"/>
                 <a:ea typeface="DejaVu Sans Condensed" panose="020B0606030804020204" pitchFamily="34" charset="0"/>
                 <a:cs typeface="DejaVu Sans Condensed" panose="020B0606030804020204" pitchFamily="34" charset="0"/>
@@ -4026,15 +4298,15 @@
               <a:t>BioBERT</a:t>
             </a:r>
             <a:r>
-              <a:rPr lang="en-US" sz="740" i="1" dirty="0">
+              <a:rPr lang="en-US" sz="550" i="1" dirty="0">
                 <a:latin typeface="DejaVu Sans Condensed" panose="020B0606030804020204" pitchFamily="34" charset="0"/>
                 <a:ea typeface="DejaVu Sans Condensed" panose="020B0606030804020204" pitchFamily="34" charset="0"/>
                 <a:cs typeface="DejaVu Sans Condensed" panose="020B0606030804020204" pitchFamily="34" charset="0"/>
               </a:rPr>
-              <a:t> and OGER, our dictionary-based tool) was merged according to different strategies determined most effective in previous work depending on the entity type. The </a:t>
-            </a:r>
-            <a:r>
-              <a:rPr lang="en-US" sz="740" i="1" dirty="0" err="1">
+              <a:t> and OGER, our dictionary-based tool) according to the strategy determined most effective in previous work for the respective entity type. The </a:t>
+            </a:r>
+            <a:r>
+              <a:rPr lang="en-US" sz="550" i="1" dirty="0" err="1">
                 <a:latin typeface="DejaVu Sans Condensed" panose="020B0606030804020204" pitchFamily="34" charset="0"/>
                 <a:ea typeface="DejaVu Sans Condensed" panose="020B0606030804020204" pitchFamily="34" charset="0"/>
                 <a:cs typeface="DejaVu Sans Condensed" panose="020B0606030804020204" pitchFamily="34" charset="0"/>
@@ -4042,12 +4314,12 @@
               <a:t>BioBert</a:t>
             </a:r>
             <a:r>
-              <a:rPr lang="en-US" sz="740" i="1" dirty="0">
+              <a:rPr lang="en-US" sz="550" i="1" dirty="0">
                 <a:latin typeface="DejaVu Sans Condensed" panose="020B0606030804020204" pitchFamily="34" charset="0"/>
                 <a:ea typeface="DejaVu Sans Condensed" panose="020B0606030804020204" pitchFamily="34" charset="0"/>
                 <a:cs typeface="DejaVu Sans Condensed" panose="020B0606030804020204" pitchFamily="34" charset="0"/>
               </a:rPr>
-              <a:t> models produce either ID or span annotations. In the latter case, the ID of the entity was supplied by OGER. This approach helps to optimize both recall and precision. Then, another run of OGER with a hand-crafted dictionary for terms specific to COVID-19, allowing us to make quick changes without retraining models.</a:t>
+              <a:t> models produce either ID or span annotations. In the latter case, the ID of the entity was supplied by OGER. This approach helps to optimize both recall and precision. Then, another run of OGER with a hand-crafted dictionary for terms specific to COVID-19, allowing us to make quick changes without retraining the models.</a:t>
             </a:r>
           </a:p>
         </p:txBody>
@@ -4058,36 +4330,6 @@
             <a:extLst>
               <a:ext uri="{FF2B5EF4-FFF2-40B4-BE49-F238E27FC236}">
                 <a16:creationId xmlns:a16="http://schemas.microsoft.com/office/drawing/2014/main" id="{F1784B7B-D898-1E4F-826E-91013D32A0A7}"/>
-              </a:ext>
-            </a:extLst>
-          </p:cNvPr>
-          <p:cNvPicPr>
-            <a:picLocks noChangeAspect="1"/>
-          </p:cNvPicPr>
-          <p:nvPr/>
-        </p:nvPicPr>
-        <p:blipFill>
-          <a:blip r:embed="rId2"/>
-          <a:stretch>
-            <a:fillRect/>
-          </a:stretch>
-        </p:blipFill>
-        <p:spPr>
-          <a:xfrm>
-            <a:off x="9427172" y="1675451"/>
-            <a:ext cx="2659656" cy="817229"/>
-          </a:xfrm>
-          <a:prstGeom prst="rect">
-            <a:avLst/>
-          </a:prstGeom>
-        </p:spPr>
-      </p:pic>
-      <p:pic>
-        <p:nvPicPr>
-          <p:cNvPr id="6" name="Picture 5">
-            <a:extLst>
-              <a:ext uri="{FF2B5EF4-FFF2-40B4-BE49-F238E27FC236}">
-                <a16:creationId xmlns:a16="http://schemas.microsoft.com/office/drawing/2014/main" id="{C5FE5883-2C0D-8740-9BAF-80F86D4991F3}"/>
               </a:ext>
             </a:extLst>
           </p:cNvPr>
@@ -4104,8 +4346,8 @@
         </p:blipFill>
         <p:spPr>
           <a:xfrm>
-            <a:off x="6155549" y="1624554"/>
-            <a:ext cx="2787283" cy="1630601"/>
+            <a:off x="6167906" y="1782446"/>
+            <a:ext cx="4808990" cy="1477652"/>
           </a:xfrm>
           <a:prstGeom prst="rect">
             <a:avLst/>
@@ -4114,10 +4356,10 @@
       </p:pic>
       <p:pic>
         <p:nvPicPr>
-          <p:cNvPr id="14" name="Picture 13">
-            <a:extLst>
-              <a:ext uri="{FF2B5EF4-FFF2-40B4-BE49-F238E27FC236}">
-                <a16:creationId xmlns:a16="http://schemas.microsoft.com/office/drawing/2014/main" id="{E0E3A71B-67DB-7945-9D3E-470714AB5F38}"/>
+          <p:cNvPr id="6" name="Picture 5">
+            <a:extLst>
+              <a:ext uri="{FF2B5EF4-FFF2-40B4-BE49-F238E27FC236}">
+                <a16:creationId xmlns:a16="http://schemas.microsoft.com/office/drawing/2014/main" id="{C5FE5883-2C0D-8740-9BAF-80F86D4991F3}"/>
               </a:ext>
             </a:extLst>
           </p:cNvPr>
@@ -4134,8 +4376,8 @@
         </p:blipFill>
         <p:spPr>
           <a:xfrm>
-            <a:off x="6155549" y="3720388"/>
-            <a:ext cx="1862282" cy="1588180"/>
+            <a:off x="6147307" y="3709003"/>
+            <a:ext cx="2391211" cy="1630601"/>
           </a:xfrm>
           <a:prstGeom prst="rect">
             <a:avLst/>
@@ -4144,10 +4386,10 @@
       </p:pic>
       <p:pic>
         <p:nvPicPr>
-          <p:cNvPr id="20" name="Picture 19">
-            <a:extLst>
-              <a:ext uri="{FF2B5EF4-FFF2-40B4-BE49-F238E27FC236}">
-                <a16:creationId xmlns:a16="http://schemas.microsoft.com/office/drawing/2014/main" id="{E08CEC55-7B3C-2742-8F4E-E6C8403E938F}"/>
+          <p:cNvPr id="14" name="Picture 13">
+            <a:extLst>
+              <a:ext uri="{FF2B5EF4-FFF2-40B4-BE49-F238E27FC236}">
+                <a16:creationId xmlns:a16="http://schemas.microsoft.com/office/drawing/2014/main" id="{E0E3A71B-67DB-7945-9D3E-470714AB5F38}"/>
               </a:ext>
             </a:extLst>
           </p:cNvPr>
@@ -4164,102 +4406,20 @@
         </p:blipFill>
         <p:spPr>
           <a:xfrm>
-            <a:off x="0" y="5626414"/>
-            <a:ext cx="3138851" cy="1365891"/>
+            <a:off x="10607118" y="3733706"/>
+            <a:ext cx="1505719" cy="1284098"/>
           </a:xfrm>
           <a:prstGeom prst="rect">
             <a:avLst/>
           </a:prstGeom>
         </p:spPr>
       </p:pic>
-      <p:sp>
-        <p:nvSpPr>
-          <p:cNvPr id="25" name="TextBox 24">
-            <a:extLst>
-              <a:ext uri="{FF2B5EF4-FFF2-40B4-BE49-F238E27FC236}">
-                <a16:creationId xmlns:a16="http://schemas.microsoft.com/office/drawing/2014/main" id="{4BDBB7FF-A3C1-8C47-A13F-DFE54E1BFD0E}"/>
-              </a:ext>
-            </a:extLst>
-          </p:cNvPr>
-          <p:cNvSpPr txBox="1"/>
-          <p:nvPr/>
-        </p:nvSpPr>
-        <p:spPr>
-          <a:xfrm>
-            <a:off x="8024432" y="6112961"/>
-            <a:ext cx="3183864" cy="369332"/>
-          </a:xfrm>
-          <a:prstGeom prst="rect">
-            <a:avLst/>
-          </a:prstGeom>
-          <a:noFill/>
-        </p:spPr>
-        <p:txBody>
-          <a:bodyPr wrap="square" rtlCol="0" anchor="ctr">
-            <a:spAutoFit/>
-          </a:bodyPr>
-          <a:lstStyle/>
-          <a:p>
-            <a:pPr algn="r"/>
-            <a:r>
-              <a:rPr lang="en-US" i="1" dirty="0">
-                <a:solidFill>
-                  <a:schemeClr val="accent1">
-                    <a:lumMod val="40000"/>
-                    <a:lumOff val="60000"/>
-                  </a:schemeClr>
-                </a:solidFill>
-                <a:latin typeface="DejaVu Sans" panose="020B0603030804020204" pitchFamily="34" charset="0"/>
-                <a:ea typeface="DejaVu Sans" panose="020B0603030804020204" pitchFamily="34" charset="0"/>
-                <a:cs typeface="DejaVu Sans" panose="020B0603030804020204" pitchFamily="34" charset="0"/>
-              </a:rPr>
-              <a:t>paper on </a:t>
-            </a:r>
-            <a:r>
-              <a:rPr lang="en-US" i="1" dirty="0" err="1">
-                <a:solidFill>
-                  <a:schemeClr val="accent1">
-                    <a:lumMod val="20000"/>
-                    <a:lumOff val="80000"/>
-                  </a:schemeClr>
-                </a:solidFill>
-                <a:latin typeface="DejaVu Sans" panose="020B0603030804020204" pitchFamily="34" charset="0"/>
-                <a:ea typeface="DejaVu Sans" panose="020B0603030804020204" pitchFamily="34" charset="0"/>
-                <a:cs typeface="DejaVu Sans" panose="020B0603030804020204" pitchFamily="34" charset="0"/>
-                <a:hlinkClick r:id="rId6">
-                  <a:extLst>
-                    <a:ext uri="{A12FA001-AC4F-418D-AE19-62706E023703}">
-                      <ahyp:hlinkClr xmlns:ahyp="http://schemas.microsoft.com/office/drawing/2018/hyperlinkcolor" val="tx"/>
-                    </a:ext>
-                  </a:extLst>
-                </a:hlinkClick>
-              </a:rPr>
-              <a:t>OpenReview</a:t>
-            </a:r>
-            <a:r>
-              <a:rPr lang="en-US" i="1" dirty="0">
-                <a:solidFill>
-                  <a:schemeClr val="accent1">
-                    <a:lumMod val="40000"/>
-                    <a:lumOff val="60000"/>
-                  </a:schemeClr>
-                </a:solidFill>
-                <a:latin typeface="DejaVu Sans" panose="020B0603030804020204" pitchFamily="34" charset="0"/>
-                <a:ea typeface="DejaVu Sans" panose="020B0603030804020204" pitchFamily="34" charset="0"/>
-                <a:cs typeface="DejaVu Sans" panose="020B0603030804020204" pitchFamily="34" charset="0"/>
-              </a:rPr>
-              <a:t>:</a:t>
-            </a:r>
-          </a:p>
-        </p:txBody>
-      </p:sp>
       <p:pic>
         <p:nvPicPr>
-          <p:cNvPr id="5" name="Picture 4" descr="Qr code&#10;&#10;Description automatically generated">
-            <a:hlinkClick r:id="rId6"/>
-            <a:extLst>
-              <a:ext uri="{FF2B5EF4-FFF2-40B4-BE49-F238E27FC236}">
-                <a16:creationId xmlns:a16="http://schemas.microsoft.com/office/drawing/2014/main" id="{E3C67173-604B-A541-A6F4-A4F2AB41D63A}"/>
+          <p:cNvPr id="20" name="Picture 19">
+            <a:extLst>
+              <a:ext uri="{FF2B5EF4-FFF2-40B4-BE49-F238E27FC236}">
+                <a16:creationId xmlns:a16="http://schemas.microsoft.com/office/drawing/2014/main" id="{E08CEC55-7B3C-2742-8F4E-E6C8403E938F}"/>
               </a:ext>
             </a:extLst>
           </p:cNvPr>
@@ -4269,15 +4429,15 @@
           <p:nvPr/>
         </p:nvPicPr>
         <p:blipFill>
-          <a:blip r:embed="rId7"/>
+          <a:blip r:embed="rId6"/>
           <a:stretch>
             <a:fillRect/>
           </a:stretch>
         </p:blipFill>
         <p:spPr>
           <a:xfrm>
-            <a:off x="11208296" y="5870442"/>
-            <a:ext cx="878532" cy="878532"/>
+            <a:off x="-107120" y="5598666"/>
+            <a:ext cx="3138851" cy="1365891"/>
           </a:xfrm>
           <a:prstGeom prst="rect">
             <a:avLst/>
@@ -4335,8 +4495,439 @@
           <a:lstStyle/>
           <a:p>
             <a:pPr algn="ctr"/>
-            <a:r>
-              <a:rPr lang="en-CH" sz="1700" dirty="0">
+            <a:endParaRPr lang="en-CH" sz="1700" b="1" dirty="0">
+              <a:solidFill>
+                <a:schemeClr val="tx2">
+                  <a:lumMod val="75000"/>
+                </a:schemeClr>
+              </a:solidFill>
+              <a:latin typeface="DejaVu Sans" panose="020B0603030804020204" pitchFamily="34" charset="0"/>
+              <a:ea typeface="DejaVu Sans" panose="020B0603030804020204" pitchFamily="34" charset="0"/>
+              <a:cs typeface="DejaVu Sans" panose="020B0603030804020204" pitchFamily="34" charset="0"/>
+            </a:endParaRPr>
+          </a:p>
+        </p:txBody>
+      </p:sp>
+      <p:sp>
+        <p:nvSpPr>
+          <p:cNvPr id="2" name="TextBox 1">
+            <a:extLst>
+              <a:ext uri="{FF2B5EF4-FFF2-40B4-BE49-F238E27FC236}">
+                <a16:creationId xmlns:a16="http://schemas.microsoft.com/office/drawing/2014/main" id="{A68CE80B-7B0F-5447-BFD3-2E198FD6CE26}"/>
+              </a:ext>
+            </a:extLst>
+          </p:cNvPr>
+          <p:cNvSpPr txBox="1"/>
+          <p:nvPr/>
+        </p:nvSpPr>
+        <p:spPr>
+          <a:xfrm>
+            <a:off x="8923578" y="5872409"/>
+            <a:ext cx="3268223" cy="923330"/>
+          </a:xfrm>
+          <a:prstGeom prst="rect">
+            <a:avLst/>
+          </a:prstGeom>
+          <a:noFill/>
+        </p:spPr>
+        <p:txBody>
+          <a:bodyPr wrap="square" rtlCol="0">
+            <a:spAutoFit/>
+          </a:bodyPr>
+          <a:lstStyle/>
+          <a:p>
+            <a:pPr algn="r"/>
+            <a:r>
+              <a:rPr lang="en-CH" dirty="0">
+                <a:solidFill>
+                  <a:schemeClr val="bg1">
+                    <a:lumMod val="85000"/>
+                  </a:schemeClr>
+                </a:solidFill>
+                <a:latin typeface="DEJAVU SANS" panose="020B0603030804020204" pitchFamily="34" charset="0"/>
+                <a:ea typeface="DEJAVU SANS" panose="020B0603030804020204" pitchFamily="34" charset="0"/>
+                <a:cs typeface="DEJAVU SANS" panose="020B0603030804020204" pitchFamily="34" charset="0"/>
+              </a:rPr>
+              <a:t>       </a:t>
+            </a:r>
+            <a:r>
+              <a:rPr lang="en-CH" dirty="0">
+                <a:solidFill>
+                  <a:schemeClr val="bg1">
+                    <a:lumMod val="95000"/>
+                  </a:schemeClr>
+                </a:solidFill>
+                <a:latin typeface="DEJAVU SANS" panose="020B0603030804020204" pitchFamily="34" charset="0"/>
+                <a:ea typeface="DEJAVU SANS" panose="020B0603030804020204" pitchFamily="34" charset="0"/>
+                <a:cs typeface="DEJAVU SANS" panose="020B0603030804020204" pitchFamily="34" charset="0"/>
+              </a:rPr>
+              <a:t>Furrer</a:t>
+            </a:r>
+            <a:r>
+              <a:rPr lang="en-CH" dirty="0">
+                <a:solidFill>
+                  <a:schemeClr val="bg1">
+                    <a:lumMod val="75000"/>
+                  </a:schemeClr>
+                </a:solidFill>
+                <a:latin typeface="DEJAVU SANS" panose="020B0603030804020204" pitchFamily="34" charset="0"/>
+                <a:ea typeface="DEJAVU SANS" panose="020B0603030804020204" pitchFamily="34" charset="0"/>
+                <a:cs typeface="DEJAVU SANS" panose="020B0603030804020204" pitchFamily="34" charset="0"/>
+              </a:rPr>
+              <a:t>@cl.uzh.ch</a:t>
+            </a:r>
+          </a:p>
+          <a:p>
+            <a:pPr algn="r"/>
+            <a:r>
+              <a:rPr lang="en-CH" dirty="0">
+                <a:solidFill>
+                  <a:schemeClr val="bg1">
+                    <a:lumMod val="75000"/>
+                  </a:schemeClr>
+                </a:solidFill>
+                <a:latin typeface="DEJAVU SANS" panose="020B0603030804020204" pitchFamily="34" charset="0"/>
+                <a:ea typeface="DEJAVU SANS" panose="020B0603030804020204" pitchFamily="34" charset="0"/>
+                <a:cs typeface="DEJAVU SANS" panose="020B0603030804020204" pitchFamily="34" charset="0"/>
+              </a:rPr>
+              <a:t>Fabio.</a:t>
+            </a:r>
+            <a:r>
+              <a:rPr lang="en-CH" dirty="0">
+                <a:solidFill>
+                  <a:schemeClr val="bg1">
+                    <a:lumMod val="95000"/>
+                  </a:schemeClr>
+                </a:solidFill>
+                <a:latin typeface="DEJAVU SANS" panose="020B0603030804020204" pitchFamily="34" charset="0"/>
+                <a:ea typeface="DEJAVU SANS" panose="020B0603030804020204" pitchFamily="34" charset="0"/>
+                <a:cs typeface="DEJAVU SANS" panose="020B0603030804020204" pitchFamily="34" charset="0"/>
+              </a:rPr>
+              <a:t>Rinaldi</a:t>
+            </a:r>
+            <a:r>
+              <a:rPr lang="en-CH" dirty="0">
+                <a:solidFill>
+                  <a:schemeClr val="bg1">
+                    <a:lumMod val="75000"/>
+                  </a:schemeClr>
+                </a:solidFill>
+                <a:latin typeface="DEJAVU SANS" panose="020B0603030804020204" pitchFamily="34" charset="0"/>
+                <a:ea typeface="DEJAVU SANS" panose="020B0603030804020204" pitchFamily="34" charset="0"/>
+                <a:cs typeface="DEJAVU SANS" panose="020B0603030804020204" pitchFamily="34" charset="0"/>
+              </a:rPr>
+              <a:t>@idsia.ch </a:t>
+            </a:r>
+          </a:p>
+          <a:p>
+            <a:pPr algn="r"/>
+            <a:r>
+              <a:rPr lang="en-CH" dirty="0">
+                <a:solidFill>
+                  <a:schemeClr val="bg1">
+                    <a:lumMod val="85000"/>
+                  </a:schemeClr>
+                </a:solidFill>
+                <a:latin typeface="DEJAVU SANS" panose="020B0603030804020204" pitchFamily="34" charset="0"/>
+                <a:ea typeface="DEJAVU SANS" panose="020B0603030804020204" pitchFamily="34" charset="0"/>
+                <a:cs typeface="DEJAVU SANS" panose="020B0603030804020204" pitchFamily="34" charset="0"/>
+              </a:rPr>
+              <a:t>        </a:t>
+            </a:r>
+            <a:r>
+              <a:rPr lang="en-CH" dirty="0">
+                <a:solidFill>
+                  <a:schemeClr val="bg1">
+                    <a:lumMod val="95000"/>
+                  </a:schemeClr>
+                </a:solidFill>
+                <a:latin typeface="DEJAVU SANS" panose="020B0603030804020204" pitchFamily="34" charset="0"/>
+                <a:ea typeface="DEJAVU SANS" panose="020B0603030804020204" pitchFamily="34" charset="0"/>
+                <a:cs typeface="DEJAVU SANS" panose="020B0603030804020204" pitchFamily="34" charset="0"/>
+              </a:rPr>
+              <a:t>Colic</a:t>
+            </a:r>
+            <a:r>
+              <a:rPr lang="en-CH" dirty="0">
+                <a:solidFill>
+                  <a:schemeClr val="bg1">
+                    <a:lumMod val="75000"/>
+                  </a:schemeClr>
+                </a:solidFill>
+                <a:latin typeface="DEJAVU SANS" panose="020B0603030804020204" pitchFamily="34" charset="0"/>
+                <a:ea typeface="DEJAVU SANS" panose="020B0603030804020204" pitchFamily="34" charset="0"/>
+                <a:cs typeface="DEJAVU SANS" panose="020B0603030804020204" pitchFamily="34" charset="0"/>
+              </a:rPr>
+              <a:t>@ifi.uzh.ch</a:t>
+            </a:r>
+          </a:p>
+        </p:txBody>
+      </p:sp>
+      <p:sp>
+        <p:nvSpPr>
+          <p:cNvPr id="15" name="TextBox 14">
+            <a:extLst>
+              <a:ext uri="{FF2B5EF4-FFF2-40B4-BE49-F238E27FC236}">
+                <a16:creationId xmlns:a16="http://schemas.microsoft.com/office/drawing/2014/main" id="{8C09667A-194C-1A42-BF96-9AF93316E789}"/>
+              </a:ext>
+            </a:extLst>
+          </p:cNvPr>
+          <p:cNvSpPr txBox="1"/>
+          <p:nvPr/>
+        </p:nvSpPr>
+        <p:spPr>
+          <a:xfrm>
+            <a:off x="11061159" y="1778075"/>
+            <a:ext cx="1062740" cy="1520416"/>
+          </a:xfrm>
+          <a:prstGeom prst="rect">
+            <a:avLst/>
+          </a:prstGeom>
+          <a:noFill/>
+        </p:spPr>
+        <p:txBody>
+          <a:bodyPr wrap="square" lIns="0" tIns="0" rIns="0" bIns="0" rtlCol="0">
+            <a:spAutoFit/>
+          </a:bodyPr>
+          <a:lstStyle/>
+          <a:p>
+            <a:r>
+              <a:rPr lang="en-US" sz="760" b="1" dirty="0">
+                <a:solidFill>
+                  <a:schemeClr val="accent1">
+                    <a:lumMod val="50000"/>
+                  </a:schemeClr>
+                </a:solidFill>
+                <a:latin typeface="DejaVu Sans Condensed" panose="020B0606030804020204" pitchFamily="34" charset="0"/>
+                <a:ea typeface="DejaVu Sans Condensed" panose="020B0606030804020204" pitchFamily="34" charset="0"/>
+                <a:cs typeface="DejaVu Sans Condensed" panose="020B0606030804020204" pitchFamily="34" charset="0"/>
+              </a:rPr>
+              <a:t>The output of our pipeline is uploaded to </a:t>
+            </a:r>
+            <a:r>
+              <a:rPr lang="en-US" sz="760" b="1" dirty="0" err="1">
+                <a:solidFill>
+                  <a:schemeClr val="accent1">
+                    <a:lumMod val="50000"/>
+                  </a:schemeClr>
+                </a:solidFill>
+                <a:latin typeface="DejaVu Sans Condensed" panose="020B0606030804020204" pitchFamily="34" charset="0"/>
+                <a:ea typeface="DejaVu Sans Condensed" panose="020B0606030804020204" pitchFamily="34" charset="0"/>
+                <a:cs typeface="DejaVu Sans Condensed" panose="020B0606030804020204" pitchFamily="34" charset="0"/>
+              </a:rPr>
+              <a:t>PubAnnotation</a:t>
+            </a:r>
+            <a:r>
+              <a:rPr lang="en-US" sz="760" b="1" dirty="0">
+                <a:solidFill>
+                  <a:schemeClr val="accent1">
+                    <a:lumMod val="50000"/>
+                  </a:schemeClr>
+                </a:solidFill>
+                <a:latin typeface="DejaVu Sans Condensed" panose="020B0606030804020204" pitchFamily="34" charset="0"/>
+                <a:ea typeface="DejaVu Sans Condensed" panose="020B0606030804020204" pitchFamily="34" charset="0"/>
+                <a:cs typeface="DejaVu Sans Condensed" panose="020B0606030804020204" pitchFamily="34" charset="0"/>
+              </a:rPr>
+              <a:t>, for example, where it is visualized via </a:t>
+            </a:r>
+            <a:r>
+              <a:rPr lang="en-US" sz="760" b="1" dirty="0" err="1">
+                <a:solidFill>
+                  <a:schemeClr val="accent1">
+                    <a:lumMod val="50000"/>
+                  </a:schemeClr>
+                </a:solidFill>
+                <a:latin typeface="DejaVu Sans Condensed" panose="020B0606030804020204" pitchFamily="34" charset="0"/>
+                <a:ea typeface="DejaVu Sans Condensed" panose="020B0606030804020204" pitchFamily="34" charset="0"/>
+                <a:cs typeface="DejaVu Sans Condensed" panose="020B0606030804020204" pitchFamily="34" charset="0"/>
+              </a:rPr>
+              <a:t>TextAE</a:t>
+            </a:r>
+            <a:r>
+              <a:rPr lang="en-US" sz="760" b="1" dirty="0">
+                <a:solidFill>
+                  <a:schemeClr val="accent1">
+                    <a:lumMod val="50000"/>
+                  </a:schemeClr>
+                </a:solidFill>
+                <a:latin typeface="DejaVu Sans Condensed" panose="020B0606030804020204" pitchFamily="34" charset="0"/>
+                <a:ea typeface="DejaVu Sans Condensed" panose="020B0606030804020204" pitchFamily="34" charset="0"/>
+                <a:cs typeface="DejaVu Sans Condensed" panose="020B0606030804020204" pitchFamily="34" charset="0"/>
+              </a:rPr>
+              <a:t>. We're also uploading our results to </a:t>
+            </a:r>
+            <a:r>
+              <a:rPr lang="en-US" sz="760" b="1" dirty="0" err="1">
+                <a:solidFill>
+                  <a:schemeClr val="accent1">
+                    <a:lumMod val="50000"/>
+                  </a:schemeClr>
+                </a:solidFill>
+                <a:latin typeface="DejaVu Sans Condensed" panose="020B0606030804020204" pitchFamily="34" charset="0"/>
+                <a:ea typeface="DejaVu Sans Condensed" panose="020B0606030804020204" pitchFamily="34" charset="0"/>
+                <a:cs typeface="DejaVu Sans Condensed" panose="020B0606030804020204" pitchFamily="34" charset="0"/>
+              </a:rPr>
+              <a:t>EuroPMC</a:t>
+            </a:r>
+            <a:r>
+              <a:rPr lang="en-US" sz="760" b="1" dirty="0">
+                <a:solidFill>
+                  <a:schemeClr val="accent1">
+                    <a:lumMod val="50000"/>
+                  </a:schemeClr>
+                </a:solidFill>
+                <a:latin typeface="DejaVu Sans Condensed" panose="020B0606030804020204" pitchFamily="34" charset="0"/>
+                <a:ea typeface="DejaVu Sans Condensed" panose="020B0606030804020204" pitchFamily="34" charset="0"/>
+                <a:cs typeface="DejaVu Sans Condensed" panose="020B0606030804020204" pitchFamily="34" charset="0"/>
+              </a:rPr>
+              <a:t>, our own webserver using BRAT, and allowing downloads in JSON and </a:t>
+            </a:r>
+            <a:r>
+              <a:rPr lang="en-US" sz="760" b="1" dirty="0" err="1">
+                <a:solidFill>
+                  <a:schemeClr val="accent1">
+                    <a:lumMod val="50000"/>
+                  </a:schemeClr>
+                </a:solidFill>
+                <a:latin typeface="DejaVu Sans Condensed" panose="020B0606030804020204" pitchFamily="34" charset="0"/>
+                <a:ea typeface="DejaVu Sans Condensed" panose="020B0606030804020204" pitchFamily="34" charset="0"/>
+                <a:cs typeface="DejaVu Sans Condensed" panose="020B0606030804020204" pitchFamily="34" charset="0"/>
+              </a:rPr>
+              <a:t>CoNLL</a:t>
+            </a:r>
+            <a:r>
+              <a:rPr lang="en-US" sz="760" b="1" dirty="0">
+                <a:solidFill>
+                  <a:schemeClr val="accent1">
+                    <a:lumMod val="50000"/>
+                  </a:schemeClr>
+                </a:solidFill>
+                <a:latin typeface="DejaVu Sans Condensed" panose="020B0606030804020204" pitchFamily="34" charset="0"/>
+                <a:ea typeface="DejaVu Sans Condensed" panose="020B0606030804020204" pitchFamily="34" charset="0"/>
+                <a:cs typeface="DejaVu Sans Condensed" panose="020B0606030804020204" pitchFamily="34" charset="0"/>
+              </a:rPr>
+              <a:t> TSV for downstream tasks.</a:t>
+            </a:r>
+          </a:p>
+        </p:txBody>
+      </p:sp>
+      <p:sp>
+        <p:nvSpPr>
+          <p:cNvPr id="17" name="TextBox 16">
+            <a:extLst>
+              <a:ext uri="{FF2B5EF4-FFF2-40B4-BE49-F238E27FC236}">
+                <a16:creationId xmlns:a16="http://schemas.microsoft.com/office/drawing/2014/main" id="{10A46E81-896B-2A41-90B5-B00ACDE9985A}"/>
+              </a:ext>
+            </a:extLst>
+          </p:cNvPr>
+          <p:cNvSpPr txBox="1"/>
+          <p:nvPr/>
+        </p:nvSpPr>
+        <p:spPr>
+          <a:xfrm>
+            <a:off x="10607118" y="5075625"/>
+            <a:ext cx="1505719" cy="267766"/>
+          </a:xfrm>
+          <a:prstGeom prst="rect">
+            <a:avLst/>
+          </a:prstGeom>
+          <a:noFill/>
+        </p:spPr>
+        <p:txBody>
+          <a:bodyPr wrap="square" lIns="0" tIns="0" rIns="0" bIns="0" rtlCol="0">
+            <a:spAutoFit/>
+          </a:bodyPr>
+          <a:lstStyle/>
+          <a:p>
+            <a:pPr algn="just"/>
+            <a:r>
+              <a:rPr lang="en-US" sz="570" dirty="0">
+                <a:solidFill>
+                  <a:schemeClr val="bg1">
+                    <a:lumMod val="95000"/>
+                  </a:schemeClr>
+                </a:solidFill>
+                <a:latin typeface="DejaVu Sans" panose="020B0603030804020204" pitchFamily="34" charset="0"/>
+                <a:ea typeface="DejaVu Sans" panose="020B0603030804020204" pitchFamily="34" charset="0"/>
+                <a:cs typeface="DejaVu Sans" panose="020B0603030804020204" pitchFamily="34" charset="0"/>
+              </a:rPr>
+              <a:t>Annotations per entity type for PubMed (20k abstracts)  and PMC (5k full articles)</a:t>
+            </a:r>
+          </a:p>
+          <a:p>
+            <a:pPr algn="just"/>
+            <a:endParaRPr lang="en-CH" sz="600" dirty="0">
+              <a:solidFill>
+                <a:schemeClr val="bg1">
+                  <a:lumMod val="95000"/>
+                </a:schemeClr>
+              </a:solidFill>
+            </a:endParaRPr>
+          </a:p>
+        </p:txBody>
+      </p:sp>
+      <p:pic>
+        <p:nvPicPr>
+          <p:cNvPr id="19" name="Picture 18" descr="Qr code&#10;&#10;Description automatically generated">
+            <a:hlinkClick r:id="rId7"/>
+            <a:extLst>
+              <a:ext uri="{FF2B5EF4-FFF2-40B4-BE49-F238E27FC236}">
+                <a16:creationId xmlns:a16="http://schemas.microsoft.com/office/drawing/2014/main" id="{345A26F5-CCFE-B04E-98EA-94EDD0E9A291}"/>
+              </a:ext>
+            </a:extLst>
+          </p:cNvPr>
+          <p:cNvPicPr>
+            <a:picLocks noChangeAspect="1"/>
+          </p:cNvPicPr>
+          <p:nvPr/>
+        </p:nvPicPr>
+        <p:blipFill>
+          <a:blip r:embed="rId8"/>
+          <a:stretch>
+            <a:fillRect/>
+          </a:stretch>
+        </p:blipFill>
+        <p:spPr>
+          <a:xfrm>
+            <a:off x="481649" y="4571785"/>
+            <a:ext cx="766384" cy="766384"/>
+          </a:xfrm>
+          <a:prstGeom prst="rect">
+            <a:avLst/>
+          </a:prstGeom>
+        </p:spPr>
+      </p:pic>
+      <p:sp>
+        <p:nvSpPr>
+          <p:cNvPr id="21" name="TextBox 20">
+            <a:extLst>
+              <a:ext uri="{FF2B5EF4-FFF2-40B4-BE49-F238E27FC236}">
+                <a16:creationId xmlns:a16="http://schemas.microsoft.com/office/drawing/2014/main" id="{B67B66EC-049B-E547-9AB6-B3A2879CDC47}"/>
+              </a:ext>
+            </a:extLst>
+          </p:cNvPr>
+          <p:cNvSpPr txBox="1"/>
+          <p:nvPr/>
+        </p:nvSpPr>
+        <p:spPr>
+          <a:xfrm>
+            <a:off x="1235676" y="4621213"/>
+            <a:ext cx="4363627" cy="646331"/>
+          </a:xfrm>
+          <a:prstGeom prst="rect">
+            <a:avLst/>
+          </a:prstGeom>
+          <a:noFill/>
+        </p:spPr>
+        <p:txBody>
+          <a:bodyPr wrap="square" rtlCol="0">
+            <a:spAutoFit/>
+          </a:bodyPr>
+          <a:lstStyle/>
+          <a:p>
+            <a:pPr algn="ctr"/>
+            <a:r>
+              <a:rPr lang="en-CH" dirty="0">
                 <a:solidFill>
                   <a:schemeClr val="accent1">
                     <a:lumMod val="50000"/>
@@ -4349,16 +4940,16 @@
               <a:t>All the data can be found online at </a:t>
             </a:r>
             <a:r>
-              <a:rPr lang="en-GB" sz="1700" b="1" dirty="0" err="1">
+              <a:rPr lang="en-GB" b="1" dirty="0">
                 <a:solidFill>
-                  <a:schemeClr val="accent5">
-                    <a:lumMod val="50000"/>
+                  <a:schemeClr val="tx2">
+                    <a:lumMod val="75000"/>
                   </a:schemeClr>
                 </a:solidFill>
                 <a:latin typeface="DejaVu Sans" panose="020B0603030804020204" pitchFamily="34" charset="0"/>
                 <a:ea typeface="DejaVu Sans" panose="020B0603030804020204" pitchFamily="34" charset="0"/>
                 <a:cs typeface="DejaVu Sans" panose="020B0603030804020204" pitchFamily="34" charset="0"/>
-                <a:hlinkClick r:id="rId8">
+                <a:hlinkClick r:id="rId9">
                   <a:extLst>
                     <a:ext uri="{A12FA001-AC4F-418D-AE19-62706E023703}">
                       <ahyp:hlinkClr xmlns:ahyp="http://schemas.microsoft.com/office/drawing/2018/hyperlinkcolor" val="tx"/>
@@ -4366,45 +4957,12 @@
                   </a:extLst>
                 </a:hlinkClick>
               </a:rPr>
-              <a:t>pub.cl.uzh.ch</a:t>
-            </a:r>
-            <a:r>
-              <a:rPr lang="en-GB" sz="1700" b="1" dirty="0">
-                <a:solidFill>
-                  <a:schemeClr val="accent5">
-                    <a:lumMod val="50000"/>
-                  </a:schemeClr>
-                </a:solidFill>
-                <a:latin typeface="DejaVu Sans" panose="020B0603030804020204" pitchFamily="34" charset="0"/>
-                <a:ea typeface="DejaVu Sans" panose="020B0603030804020204" pitchFamily="34" charset="0"/>
-                <a:cs typeface="DejaVu Sans" panose="020B0603030804020204" pitchFamily="34" charset="0"/>
-                <a:hlinkClick r:id="rId8">
-                  <a:extLst>
-                    <a:ext uri="{A12FA001-AC4F-418D-AE19-62706E023703}">
-                      <ahyp:hlinkClr xmlns:ahyp="http://schemas.microsoft.com/office/drawing/2018/hyperlinkcolor" val="tx"/>
-                    </a:ext>
-                  </a:extLst>
-                </a:hlinkClick>
-              </a:rPr>
-              <a:t>/projects/COVID19</a:t>
-            </a:r>
-            <a:r>
-              <a:rPr lang="en-GB" sz="1700" b="1" dirty="0">
-                <a:solidFill>
-                  <a:schemeClr val="accent1">
-                    <a:lumMod val="50000"/>
-                  </a:schemeClr>
-                </a:solidFill>
-                <a:latin typeface="DejaVu Sans" panose="020B0603030804020204" pitchFamily="34" charset="0"/>
-                <a:ea typeface="DejaVu Sans" panose="020B0603030804020204" pitchFamily="34" charset="0"/>
-                <a:cs typeface="DejaVu Sans" panose="020B0603030804020204" pitchFamily="34" charset="0"/>
-              </a:rPr>
-              <a:t>/</a:t>
-            </a:r>
-            <a:endParaRPr lang="en-CH" sz="1700" b="1" dirty="0">
+              <a:t>covid19.nlp.idsia.ch/lbd.html</a:t>
+            </a:r>
+            <a:endParaRPr lang="en-CH" b="1" dirty="0">
               <a:solidFill>
-                <a:schemeClr val="accent1">
-                  <a:lumMod val="50000"/>
+                <a:schemeClr val="tx2">
+                  <a:lumMod val="75000"/>
                 </a:schemeClr>
               </a:solidFill>
               <a:latin typeface="DejaVu Sans" panose="020B0603030804020204" pitchFamily="34" charset="0"/>
@@ -4414,6 +4972,192 @@
           </a:p>
         </p:txBody>
       </p:sp>
+      <p:pic>
+        <p:nvPicPr>
+          <p:cNvPr id="26" name="Picture 25" descr="A picture containing chart&#10;&#10;Description automatically generated">
+            <a:extLst>
+              <a:ext uri="{FF2B5EF4-FFF2-40B4-BE49-F238E27FC236}">
+                <a16:creationId xmlns:a16="http://schemas.microsoft.com/office/drawing/2014/main" id="{9E93F7A7-7026-9A42-AA71-D7CE2B20514F}"/>
+              </a:ext>
+            </a:extLst>
+          </p:cNvPr>
+          <p:cNvPicPr>
+            <a:picLocks noChangeAspect="1"/>
+          </p:cNvPicPr>
+          <p:nvPr/>
+        </p:nvPicPr>
+        <p:blipFill>
+          <a:blip r:embed="rId10"/>
+          <a:stretch>
+            <a:fillRect/>
+          </a:stretch>
+        </p:blipFill>
+        <p:spPr>
+          <a:xfrm>
+            <a:off x="2957550" y="5860534"/>
+            <a:ext cx="919877" cy="910491"/>
+          </a:xfrm>
+          <a:prstGeom prst="rect">
+            <a:avLst/>
+          </a:prstGeom>
+        </p:spPr>
+      </p:pic>
+      <p:pic>
+        <p:nvPicPr>
+          <p:cNvPr id="30" name="Picture 29" descr="A picture containing chart&#10;&#10;Description automatically generated">
+            <a:extLst>
+              <a:ext uri="{FF2B5EF4-FFF2-40B4-BE49-F238E27FC236}">
+                <a16:creationId xmlns:a16="http://schemas.microsoft.com/office/drawing/2014/main" id="{A71C247A-CE05-6540-A8B2-3FF6CD02DBA6}"/>
+              </a:ext>
+            </a:extLst>
+          </p:cNvPr>
+          <p:cNvPicPr>
+            <a:picLocks noChangeAspect="1"/>
+          </p:cNvPicPr>
+          <p:nvPr/>
+        </p:nvPicPr>
+        <p:blipFill>
+          <a:blip r:embed="rId11"/>
+          <a:stretch>
+            <a:fillRect/>
+          </a:stretch>
+        </p:blipFill>
+        <p:spPr>
+          <a:xfrm>
+            <a:off x="2957551" y="5726295"/>
+            <a:ext cx="1985151" cy="1122405"/>
+          </a:xfrm>
+          <a:prstGeom prst="rect">
+            <a:avLst/>
+          </a:prstGeom>
+        </p:spPr>
+      </p:pic>
+      <p:sp>
+        <p:nvSpPr>
+          <p:cNvPr id="33" name="Rectangle 32">
+            <a:extLst>
+              <a:ext uri="{FF2B5EF4-FFF2-40B4-BE49-F238E27FC236}">
+                <a16:creationId xmlns:a16="http://schemas.microsoft.com/office/drawing/2014/main" id="{C8C0B082-D317-0048-B16C-1BA533D6586C}"/>
+              </a:ext>
+            </a:extLst>
+          </p:cNvPr>
+          <p:cNvSpPr/>
+          <p:nvPr/>
+        </p:nvSpPr>
+        <p:spPr>
+          <a:xfrm>
+            <a:off x="7434654" y="5727771"/>
+            <a:ext cx="1820560" cy="1122407"/>
+          </a:xfrm>
+          <a:prstGeom prst="rect">
+            <a:avLst/>
+          </a:prstGeom>
+          <a:solidFill>
+            <a:schemeClr val="bg1"/>
+          </a:solidFill>
+          <a:ln>
+            <a:noFill/>
+          </a:ln>
+        </p:spPr>
+        <p:style>
+          <a:lnRef idx="2">
+            <a:schemeClr val="accent1">
+              <a:shade val="50000"/>
+            </a:schemeClr>
+          </a:lnRef>
+          <a:fillRef idx="1">
+            <a:schemeClr val="accent1"/>
+          </a:fillRef>
+          <a:effectRef idx="0">
+            <a:schemeClr val="accent1"/>
+          </a:effectRef>
+          <a:fontRef idx="minor">
+            <a:schemeClr val="lt1"/>
+          </a:fontRef>
+        </p:style>
+        <p:txBody>
+          <a:bodyPr rtlCol="0" anchor="ctr"/>
+          <a:lstStyle/>
+          <a:p>
+            <a:pPr algn="ctr"/>
+            <a:r>
+              <a:rPr lang="en-CH" dirty="0"/>
+              <a:t>§§</a:t>
+            </a:r>
+          </a:p>
+        </p:txBody>
+      </p:sp>
+      <p:pic>
+        <p:nvPicPr>
+          <p:cNvPr id="32" name="Picture 31" descr="Text&#10;&#10;Description automatically generated">
+            <a:extLst>
+              <a:ext uri="{FF2B5EF4-FFF2-40B4-BE49-F238E27FC236}">
+                <a16:creationId xmlns:a16="http://schemas.microsoft.com/office/drawing/2014/main" id="{DAFFA0DA-A0D5-AA4B-9493-7CC7804A9FE7}"/>
+              </a:ext>
+            </a:extLst>
+          </p:cNvPr>
+          <p:cNvPicPr>
+            <a:picLocks noChangeAspect="1"/>
+          </p:cNvPicPr>
+          <p:nvPr/>
+        </p:nvPicPr>
+        <p:blipFill>
+          <a:blip r:embed="rId12"/>
+          <a:stretch>
+            <a:fillRect/>
+          </a:stretch>
+        </p:blipFill>
+        <p:spPr>
+          <a:xfrm>
+            <a:off x="7504177" y="5847695"/>
+            <a:ext cx="1704609" cy="923330"/>
+          </a:xfrm>
+          <a:prstGeom prst="rect">
+            <a:avLst/>
+          </a:prstGeom>
+        </p:spPr>
+      </p:pic>
+      <p:cxnSp>
+        <p:nvCxnSpPr>
+          <p:cNvPr id="35" name="Straight Connector 34">
+            <a:extLst>
+              <a:ext uri="{FF2B5EF4-FFF2-40B4-BE49-F238E27FC236}">
+                <a16:creationId xmlns:a16="http://schemas.microsoft.com/office/drawing/2014/main" id="{C9F2509E-33DF-0C4D-9D5E-EA0BFB763DA2}"/>
+              </a:ext>
+            </a:extLst>
+          </p:cNvPr>
+          <p:cNvCxnSpPr/>
+          <p:nvPr/>
+        </p:nvCxnSpPr>
+        <p:spPr>
+          <a:xfrm>
+            <a:off x="0" y="5760720"/>
+            <a:ext cx="12192000" cy="0"/>
+          </a:xfrm>
+          <a:prstGeom prst="line">
+            <a:avLst/>
+          </a:prstGeom>
+          <a:ln w="25400">
+            <a:solidFill>
+              <a:schemeClr val="accent1"/>
+            </a:solidFill>
+          </a:ln>
+        </p:spPr>
+        <p:style>
+          <a:lnRef idx="1">
+            <a:schemeClr val="accent1"/>
+          </a:lnRef>
+          <a:fillRef idx="0">
+            <a:schemeClr val="accent1"/>
+          </a:fillRef>
+          <a:effectRef idx="0">
+            <a:schemeClr val="accent1"/>
+          </a:effectRef>
+          <a:fontRef idx="minor">
+            <a:schemeClr val="tx1"/>
+          </a:fontRef>
+        </p:style>
+      </p:cxnSp>
     </p:spTree>
     <p:extLst>
       <p:ext uri="{BB962C8B-B14F-4D97-AF65-F5344CB8AC3E}">
@@ -4720,4 +5464,299 @@
     </a:ext>
   </a:extLst>
 </a:theme>
+</file>
+
+<file path=ppt/theme/theme2.xml><?xml version="1.0" encoding="utf-8"?>
+<a:theme xmlns:a="http://schemas.openxmlformats.org/drawingml/2006/main" name="Office Theme">
+  <a:themeElements>
+    <a:clrScheme name="Office">
+      <a:dk1>
+        <a:sysClr val="windowText" lastClr="000000"/>
+      </a:dk1>
+      <a:lt1>
+        <a:sysClr val="window" lastClr="FFFFFF"/>
+      </a:lt1>
+      <a:dk2>
+        <a:srgbClr val="44546A"/>
+      </a:dk2>
+      <a:lt2>
+        <a:srgbClr val="E7E6E6"/>
+      </a:lt2>
+      <a:accent1>
+        <a:srgbClr val="4472C4"/>
+      </a:accent1>
+      <a:accent2>
+        <a:srgbClr val="ED7D31"/>
+      </a:accent2>
+      <a:accent3>
+        <a:srgbClr val="A5A5A5"/>
+      </a:accent3>
+      <a:accent4>
+        <a:srgbClr val="FFC000"/>
+      </a:accent4>
+      <a:accent5>
+        <a:srgbClr val="5B9BD5"/>
+      </a:accent5>
+      <a:accent6>
+        <a:srgbClr val="70AD47"/>
+      </a:accent6>
+      <a:hlink>
+        <a:srgbClr val="0563C1"/>
+      </a:hlink>
+      <a:folHlink>
+        <a:srgbClr val="954F72"/>
+      </a:folHlink>
+    </a:clrScheme>
+    <a:fontScheme name="Office">
+      <a:majorFont>
+        <a:latin typeface="Calibri Light" panose="020F0302020204030204"/>
+        <a:ea typeface=""/>
+        <a:cs typeface=""/>
+        <a:font script="Jpan" typeface="游ゴシック Light"/>
+        <a:font script="Hang" typeface="맑은 고딕"/>
+        <a:font script="Hans" typeface="等线 Light"/>
+        <a:font script="Hant" typeface="新細明體"/>
+        <a:font script="Arab" typeface="Times New Roman"/>
+        <a:font script="Hebr" typeface="Times New Roman"/>
+        <a:font script="Thai" typeface="Angsana New"/>
+        <a:font script="Ethi" typeface="Nyala"/>
+        <a:font script="Beng" typeface="Vrinda"/>
+        <a:font script="Gujr" typeface="Shruti"/>
+        <a:font script="Khmr" typeface="MoolBoran"/>
+        <a:font script="Knda" typeface="Tunga"/>
+        <a:font script="Guru" typeface="Raavi"/>
+        <a:font script="Cans" typeface="Euphemia"/>
+        <a:font script="Cher" typeface="Plantagenet Cherokee"/>
+        <a:font script="Yiii" typeface="Microsoft Yi Baiti"/>
+        <a:font script="Tibt" typeface="Microsoft Himalaya"/>
+        <a:font script="Thaa" typeface="MV Boli"/>
+        <a:font script="Deva" typeface="Mangal"/>
+        <a:font script="Telu" typeface="Gautami"/>
+        <a:font script="Taml" typeface="Latha"/>
+        <a:font script="Syrc" typeface="Estrangelo Edessa"/>
+        <a:font script="Orya" typeface="Kalinga"/>
+        <a:font script="Mlym" typeface="Kartika"/>
+        <a:font script="Laoo" typeface="DokChampa"/>
+        <a:font script="Sinh" typeface="Iskoola Pota"/>
+        <a:font script="Mong" typeface="Mongolian Baiti"/>
+        <a:font script="Viet" typeface="Times New Roman"/>
+        <a:font script="Uigh" typeface="Microsoft Uighur"/>
+        <a:font script="Geor" typeface="Sylfaen"/>
+        <a:font script="Armn" typeface="Arial"/>
+        <a:font script="Bugi" typeface="Leelawadee UI"/>
+        <a:font script="Bopo" typeface="Microsoft JhengHei"/>
+        <a:font script="Java" typeface="Javanese Text"/>
+        <a:font script="Lisu" typeface="Segoe UI"/>
+        <a:font script="Mymr" typeface="Myanmar Text"/>
+        <a:font script="Nkoo" typeface="Ebrima"/>
+        <a:font script="Olck" typeface="Nirmala UI"/>
+        <a:font script="Osma" typeface="Ebrima"/>
+        <a:font script="Phag" typeface="Phagspa"/>
+        <a:font script="Syrn" typeface="Estrangelo Edessa"/>
+        <a:font script="Syrj" typeface="Estrangelo Edessa"/>
+        <a:font script="Syre" typeface="Estrangelo Edessa"/>
+        <a:font script="Sora" typeface="Nirmala UI"/>
+        <a:font script="Tale" typeface="Microsoft Tai Le"/>
+        <a:font script="Talu" typeface="Microsoft New Tai Lue"/>
+        <a:font script="Tfng" typeface="Ebrima"/>
+      </a:majorFont>
+      <a:minorFont>
+        <a:latin typeface="Calibri" panose="020F0502020204030204"/>
+        <a:ea typeface=""/>
+        <a:cs typeface=""/>
+        <a:font script="Jpan" typeface="游ゴシック"/>
+        <a:font script="Hang" typeface="맑은 고딕"/>
+        <a:font script="Hans" typeface="等线"/>
+        <a:font script="Hant" typeface="新細明體"/>
+        <a:font script="Arab" typeface="Arial"/>
+        <a:font script="Hebr" typeface="Arial"/>
+        <a:font script="Thai" typeface="Cordia New"/>
+        <a:font script="Ethi" typeface="Nyala"/>
+        <a:font script="Beng" typeface="Vrinda"/>
+        <a:font script="Gujr" typeface="Shruti"/>
+        <a:font script="Khmr" typeface="DaunPenh"/>
+        <a:font script="Knda" typeface="Tunga"/>
+        <a:font script="Guru" typeface="Raavi"/>
+        <a:font script="Cans" typeface="Euphemia"/>
+        <a:font script="Cher" typeface="Plantagenet Cherokee"/>
+        <a:font script="Yiii" typeface="Microsoft Yi Baiti"/>
+        <a:font script="Tibt" typeface="Microsoft Himalaya"/>
+        <a:font script="Thaa" typeface="MV Boli"/>
+        <a:font script="Deva" typeface="Mangal"/>
+        <a:font script="Telu" typeface="Gautami"/>
+        <a:font script="Taml" typeface="Latha"/>
+        <a:font script="Syrc" typeface="Estrangelo Edessa"/>
+        <a:font script="Orya" typeface="Kalinga"/>
+        <a:font script="Mlym" typeface="Kartika"/>
+        <a:font script="Laoo" typeface="DokChampa"/>
+        <a:font script="Sinh" typeface="Iskoola Pota"/>
+        <a:font script="Mong" typeface="Mongolian Baiti"/>
+        <a:font script="Viet" typeface="Arial"/>
+        <a:font script="Uigh" typeface="Microsoft Uighur"/>
+        <a:font script="Geor" typeface="Sylfaen"/>
+        <a:font script="Armn" typeface="Arial"/>
+        <a:font script="Bugi" typeface="Leelawadee UI"/>
+        <a:font script="Bopo" typeface="Microsoft JhengHei"/>
+        <a:font script="Java" typeface="Javanese Text"/>
+        <a:font script="Lisu" typeface="Segoe UI"/>
+        <a:font script="Mymr" typeface="Myanmar Text"/>
+        <a:font script="Nkoo" typeface="Ebrima"/>
+        <a:font script="Olck" typeface="Nirmala UI"/>
+        <a:font script="Osma" typeface="Ebrima"/>
+        <a:font script="Phag" typeface="Phagspa"/>
+        <a:font script="Syrn" typeface="Estrangelo Edessa"/>
+        <a:font script="Syrj" typeface="Estrangelo Edessa"/>
+        <a:font script="Syre" typeface="Estrangelo Edessa"/>
+        <a:font script="Sora" typeface="Nirmala UI"/>
+        <a:font script="Tale" typeface="Microsoft Tai Le"/>
+        <a:font script="Talu" typeface="Microsoft New Tai Lue"/>
+        <a:font script="Tfng" typeface="Ebrima"/>
+      </a:minorFont>
+    </a:fontScheme>
+    <a:fmtScheme name="Office">
+      <a:fillStyleLst>
+        <a:solidFill>
+          <a:schemeClr val="phClr"/>
+        </a:solidFill>
+        <a:gradFill rotWithShape="1">
+          <a:gsLst>
+            <a:gs pos="0">
+              <a:schemeClr val="phClr">
+                <a:lumMod val="110000"/>
+                <a:satMod val="105000"/>
+                <a:tint val="67000"/>
+              </a:schemeClr>
+            </a:gs>
+            <a:gs pos="50000">
+              <a:schemeClr val="phClr">
+                <a:lumMod val="105000"/>
+                <a:satMod val="103000"/>
+                <a:tint val="73000"/>
+              </a:schemeClr>
+            </a:gs>
+            <a:gs pos="100000">
+              <a:schemeClr val="phClr">
+                <a:lumMod val="105000"/>
+                <a:satMod val="109000"/>
+                <a:tint val="81000"/>
+              </a:schemeClr>
+            </a:gs>
+          </a:gsLst>
+          <a:lin ang="5400000" scaled="0"/>
+        </a:gradFill>
+        <a:gradFill rotWithShape="1">
+          <a:gsLst>
+            <a:gs pos="0">
+              <a:schemeClr val="phClr">
+                <a:satMod val="103000"/>
+                <a:lumMod val="102000"/>
+                <a:tint val="94000"/>
+              </a:schemeClr>
+            </a:gs>
+            <a:gs pos="50000">
+              <a:schemeClr val="phClr">
+                <a:satMod val="110000"/>
+                <a:lumMod val="100000"/>
+                <a:shade val="100000"/>
+              </a:schemeClr>
+            </a:gs>
+            <a:gs pos="100000">
+              <a:schemeClr val="phClr">
+                <a:lumMod val="99000"/>
+                <a:satMod val="120000"/>
+                <a:shade val="78000"/>
+              </a:schemeClr>
+            </a:gs>
+          </a:gsLst>
+          <a:lin ang="5400000" scaled="0"/>
+        </a:gradFill>
+      </a:fillStyleLst>
+      <a:lnStyleLst>
+        <a:ln w="6350" cap="flat" cmpd="sng" algn="ctr">
+          <a:solidFill>
+            <a:schemeClr val="phClr"/>
+          </a:solidFill>
+          <a:prstDash val="solid"/>
+          <a:miter lim="800000"/>
+        </a:ln>
+        <a:ln w="12700" cap="flat" cmpd="sng" algn="ctr">
+          <a:solidFill>
+            <a:schemeClr val="phClr"/>
+          </a:solidFill>
+          <a:prstDash val="solid"/>
+          <a:miter lim="800000"/>
+        </a:ln>
+        <a:ln w="19050" cap="flat" cmpd="sng" algn="ctr">
+          <a:solidFill>
+            <a:schemeClr val="phClr"/>
+          </a:solidFill>
+          <a:prstDash val="solid"/>
+          <a:miter lim="800000"/>
+        </a:ln>
+      </a:lnStyleLst>
+      <a:effectStyleLst>
+        <a:effectStyle>
+          <a:effectLst/>
+        </a:effectStyle>
+        <a:effectStyle>
+          <a:effectLst/>
+        </a:effectStyle>
+        <a:effectStyle>
+          <a:effectLst>
+            <a:outerShdw blurRad="57150" dist="19050" dir="5400000" algn="ctr" rotWithShape="0">
+              <a:srgbClr val="000000">
+                <a:alpha val="63000"/>
+              </a:srgbClr>
+            </a:outerShdw>
+          </a:effectLst>
+        </a:effectStyle>
+      </a:effectStyleLst>
+      <a:bgFillStyleLst>
+        <a:solidFill>
+          <a:schemeClr val="phClr"/>
+        </a:solidFill>
+        <a:solidFill>
+          <a:schemeClr val="phClr">
+            <a:tint val="95000"/>
+            <a:satMod val="170000"/>
+          </a:schemeClr>
+        </a:solidFill>
+        <a:gradFill rotWithShape="1">
+          <a:gsLst>
+            <a:gs pos="0">
+              <a:schemeClr val="phClr">
+                <a:tint val="93000"/>
+                <a:satMod val="150000"/>
+                <a:shade val="98000"/>
+                <a:lumMod val="102000"/>
+              </a:schemeClr>
+            </a:gs>
+            <a:gs pos="50000">
+              <a:schemeClr val="phClr">
+                <a:tint val="98000"/>
+                <a:satMod val="130000"/>
+                <a:shade val="90000"/>
+                <a:lumMod val="103000"/>
+              </a:schemeClr>
+            </a:gs>
+            <a:gs pos="100000">
+              <a:schemeClr val="phClr">
+                <a:shade val="63000"/>
+                <a:satMod val="120000"/>
+              </a:schemeClr>
+            </a:gs>
+          </a:gsLst>
+          <a:lin ang="5400000" scaled="0"/>
+        </a:gradFill>
+      </a:bgFillStyleLst>
+    </a:fmtScheme>
+  </a:themeElements>
+  <a:objectDefaults/>
+  <a:extraClrSchemeLst/>
+  <a:extLst>
+    <a:ext uri="{05A4C25C-085E-4340-85A3-A5531E510DB2}">
+      <thm15:themeFamily xmlns:thm15="http://schemas.microsoft.com/office/thememl/2012/main" name="Office Theme" id="{62F939B6-93AF-4DB8-9C6B-D6C7DFDC589F}" vid="{4A3C46E8-61CC-4603-A589-7422A47A8E4A}"/>
+    </a:ext>
+  </a:extLst>
+</a:theme>
 </file>
</xml_diff>